<commit_message>
Fixed animations for "10. Inheritance"
</commit_message>
<xml_diff>
--- a/Courses/Software-Sciences/Module-1-OOP-New/10-Inheritance/10-Inheritance.pptx
+++ b/Courses/Software-Sciences/Module-1-OOP-New/10-Inheritance/10-Inheritance.pptx
@@ -357,7 +357,7 @@
           <a:p>
             <a:fld id="{4E087215-0C8F-4762-A664-737A353EC9A4}" type="datetimeFigureOut">
               <a:rPr lang="bg-BG" smtClean="0"/>
-              <a:t>13.12.22 г.</a:t>
+              <a:t>21.12.22 г.</a:t>
             </a:fld>
             <a:endParaRPr lang="bg-BG"/>
           </a:p>
@@ -548,7 +548,7 @@
           <a:p>
             <a:fld id="{72D84649-876A-46C9-8472-14CB09C070D8}" type="datetimeFigureOut">
               <a:rPr lang="en-US" smtClean="0"/>
-              <a:t>12/13/22</a:t>
+              <a:t>12/21/22</a:t>
             </a:fld>
             <a:endParaRPr lang="en-US"/>
           </a:p>
@@ -15750,12 +15750,15 @@
                   </a:outerShdw>
                 </a:effectLst>
               </a:rPr>
-              <a:t>Извиква конструктора на базовия клас </a:t>
-            </a:r>
-            <a:r>
-              <a:rPr lang="en-US" sz="2400" b="1" dirty="0">
+              <a:t>Извиква конструктора на </a:t>
+            </a:r>
+            <a:r>
+              <a:rPr lang="bg-BG" sz="2400" b="1" dirty="0">
                 <a:solidFill>
-                  <a:schemeClr val="bg2"/>
+                  <a:schemeClr val="bg1">
+                    <a:lumMod val="60000"/>
+                    <a:lumOff val="40000"/>
+                  </a:schemeClr>
                 </a:solidFill>
                 <a:effectLst>
                   <a:outerShdw blurRad="38100" dist="38100" dir="2700000" algn="tl">
@@ -15765,20 +15768,8 @@
                   </a:outerShdw>
                 </a:effectLst>
               </a:rPr>
-              <a:t>(parent)</a:t>
-            </a:r>
-            <a:endParaRPr lang="bg-BG" sz="2400" b="1" dirty="0">
-              <a:solidFill>
-                <a:schemeClr val="bg2"/>
-              </a:solidFill>
-              <a:effectLst>
-                <a:outerShdw blurRad="38100" dist="38100" dir="2700000" algn="tl">
-                  <a:srgbClr val="000000">
-                    <a:alpha val="43137"/>
-                  </a:srgbClr>
-                </a:outerShdw>
-              </a:effectLst>
-            </a:endParaRPr>
+              <a:t>базовия клас</a:t>
+            </a:r>
           </a:p>
         </p:txBody>
       </p:sp>
@@ -16386,35 +16377,12 @@
               <a:t> (</a:t>
             </a:r>
             <a:r>
-              <a:rPr lang="en-GB" sz="2800" b="1" dirty="0">
+              <a:rPr lang="bg-BG" sz="2800" b="1" dirty="0">
                 <a:solidFill>
                   <a:schemeClr val="bg2"/>
                 </a:solidFill>
               </a:rPr>
-              <a:t>Derived</a:t>
-            </a:r>
-            <a:r>
-              <a:rPr lang="en-GB" sz="2800" b="1" dirty="0">
-                <a:solidFill>
-                  <a:schemeClr val="bg2"/>
-                </a:solidFill>
-                <a:effectLst>
-                  <a:outerShdw blurRad="38100" dist="38100" dir="2700000" algn="tl">
-                    <a:srgbClr val="000000">
-                      <a:alpha val="43137"/>
-                    </a:srgbClr>
-                  </a:outerShdw>
-                </a:effectLst>
-              </a:rPr>
-              <a:t> </a:t>
-            </a:r>
-            <a:r>
-              <a:rPr lang="en-GB" sz="2800" b="1" dirty="0">
-                <a:solidFill>
-                  <a:schemeClr val="bg2"/>
-                </a:solidFill>
-              </a:rPr>
-              <a:t>Class</a:t>
+              <a:t>Производен клас</a:t>
             </a:r>
             <a:r>
               <a:rPr lang="en-GB" sz="2800" b="1" dirty="0">
@@ -16574,35 +16542,12 @@
               <a:t>(</a:t>
             </a:r>
             <a:r>
-              <a:rPr lang="en-GB" sz="2800" b="1" dirty="0">
+              <a:rPr lang="bg-BG" sz="2800" b="1" dirty="0">
                 <a:solidFill>
                   <a:schemeClr val="bg2"/>
                 </a:solidFill>
               </a:rPr>
-              <a:t>Derived</a:t>
-            </a:r>
-            <a:r>
-              <a:rPr lang="en-GB" sz="2800" b="1" dirty="0">
-                <a:solidFill>
-                  <a:schemeClr val="bg2"/>
-                </a:solidFill>
-                <a:effectLst>
-                  <a:outerShdw blurRad="38100" dist="38100" dir="2700000" algn="tl">
-                    <a:srgbClr val="000000">
-                      <a:alpha val="43137"/>
-                    </a:srgbClr>
-                  </a:outerShdw>
-                </a:effectLst>
-              </a:rPr>
-              <a:t> </a:t>
-            </a:r>
-            <a:r>
-              <a:rPr lang="en-GB" sz="2800" b="1" dirty="0">
-                <a:solidFill>
-                  <a:schemeClr val="bg2"/>
-                </a:solidFill>
-              </a:rPr>
-              <a:t>Class</a:t>
+              <a:t>Производен клас</a:t>
             </a:r>
             <a:r>
               <a:rPr lang="en-GB" sz="2800" b="1" dirty="0">
@@ -16766,15 +16711,7 @@
               <a:t>(</a:t>
             </a:r>
             <a:r>
-              <a:rPr lang="en-GB" sz="2800" b="1" dirty="0">
-                <a:solidFill>
-                  <a:schemeClr val="bg2"/>
-                </a:solidFill>
-              </a:rPr>
-              <a:t>Base</a:t>
-            </a:r>
-            <a:r>
-              <a:rPr lang="en-GB" sz="2800" b="1" dirty="0">
+              <a:rPr lang="bg-BG" sz="2800" b="1" dirty="0">
                 <a:solidFill>
                   <a:schemeClr val="bg2"/>
                 </a:solidFill>
@@ -16786,15 +16723,7 @@
                   </a:outerShdw>
                 </a:effectLst>
               </a:rPr>
-              <a:t> </a:t>
-            </a:r>
-            <a:r>
-              <a:rPr lang="en-GB" sz="2800" b="1" dirty="0">
-                <a:solidFill>
-                  <a:schemeClr val="bg2"/>
-                </a:solidFill>
-              </a:rPr>
-              <a:t>Class</a:t>
+              <a:t>Базов клас</a:t>
             </a:r>
             <a:r>
               <a:rPr lang="en-GB" sz="2800" b="1" dirty="0">
@@ -17250,7 +17179,7 @@
         </p:nvSpPr>
         <p:spPr>
           <a:xfrm>
-            <a:off x="490383" y="3693808"/>
+            <a:off x="491973" y="3796966"/>
             <a:ext cx="1752600" cy="533400"/>
           </a:xfrm>
           <a:prstGeom prst="roundRect">
@@ -17316,7 +17245,7 @@
         </p:nvSpPr>
         <p:spPr>
           <a:xfrm>
-            <a:off x="3644419" y="5933280"/>
+            <a:off x="3646009" y="6036438"/>
             <a:ext cx="2438400" cy="514801"/>
           </a:xfrm>
           <a:prstGeom prst="roundRect">
@@ -17382,7 +17311,7 @@
         </p:nvSpPr>
         <p:spPr>
           <a:xfrm>
-            <a:off x="2101991" y="4771417"/>
+            <a:off x="2103581" y="4874575"/>
             <a:ext cx="1974799" cy="524100"/>
           </a:xfrm>
           <a:prstGeom prst="roundRect">
@@ -17452,7 +17381,7 @@
         </p:nvCxnSpPr>
         <p:spPr>
           <a:xfrm rot="16200000" flipV="1">
-            <a:off x="1955933" y="3637959"/>
+            <a:off x="1957523" y="3741117"/>
             <a:ext cx="544209" cy="1722708"/>
           </a:xfrm>
           <a:prstGeom prst="bentConnector3">
@@ -17506,7 +17435,7 @@
         </p:nvCxnSpPr>
         <p:spPr>
           <a:xfrm rot="16200000" flipV="1">
-            <a:off x="3657624" y="4727285"/>
+            <a:off x="3659214" y="4830443"/>
             <a:ext cx="637763" cy="1774228"/>
           </a:xfrm>
           <a:prstGeom prst="bentConnector3">
@@ -17644,7 +17573,7 @@
                                         <p:tgtEl>
                                           <p:spTgt spid="7">
                                             <p:txEl>
-                                              <p:pRg st="1" end="1"/>
+                                              <p:pRg st="0" end="0"/>
                                             </p:txEl>
                                           </p:spTgt>
                                         </p:tgtEl>
@@ -17659,35 +17588,26 @@
                                   </p:childTnLst>
                                 </p:cTn>
                               </p:par>
+                            </p:childTnLst>
+                          </p:cTn>
+                        </p:par>
+                      </p:childTnLst>
+                    </p:cTn>
+                  </p:par>
+                  <p:par>
+                    <p:cTn id="7" fill="hold">
+                      <p:stCondLst>
+                        <p:cond delay="indefinite"/>
+                      </p:stCondLst>
+                      <p:childTnLst>
+                        <p:par>
+                          <p:cTn id="8" fill="hold">
+                            <p:stCondLst>
+                              <p:cond delay="0"/>
+                            </p:stCondLst>
+                            <p:childTnLst>
                               <p:par>
-                                <p:cTn id="7" presetID="1" presetClass="entr" presetSubtype="0" fill="hold" nodeType="withEffect">
-                                  <p:stCondLst>
-                                    <p:cond delay="0"/>
-                                  </p:stCondLst>
-                                  <p:childTnLst>
-                                    <p:set>
-                                      <p:cBhvr>
-                                        <p:cTn id="8" dur="1" fill="hold">
-                                          <p:stCondLst>
-                                            <p:cond delay="0"/>
-                                          </p:stCondLst>
-                                        </p:cTn>
-                                        <p:tgtEl>
-                                          <p:spTgt spid="6"/>
-                                        </p:tgtEl>
-                                        <p:attrNameLst>
-                                          <p:attrName>style.visibility</p:attrName>
-                                        </p:attrNameLst>
-                                      </p:cBhvr>
-                                      <p:to>
-                                        <p:strVal val="visible"/>
-                                      </p:to>
-                                    </p:set>
-                                  </p:childTnLst>
-                                </p:cTn>
-                              </p:par>
-                              <p:par>
-                                <p:cTn id="9" presetID="1" presetClass="entr" presetSubtype="0" fill="hold" grpId="0" nodeType="withEffect">
+                                <p:cTn id="9" presetID="1" presetClass="entr" presetSubtype="0" fill="hold" grpId="0" nodeType="clickEffect">
                                   <p:stCondLst>
                                     <p:cond delay="0"/>
                                   </p:stCondLst>
@@ -17700,7 +17620,7 @@
                                           </p:stCondLst>
                                         </p:cTn>
                                         <p:tgtEl>
-                                          <p:spTgt spid="21"/>
+                                          <p:spTgt spid="9"/>
                                         </p:tgtEl>
                                         <p:attrNameLst>
                                           <p:attrName>style.visibility</p:attrName>
@@ -17747,6 +17667,127 @@
                                         <p:tgtEl>
                                           <p:spTgt spid="7">
                                             <p:txEl>
+                                              <p:pRg st="1" end="1"/>
+                                            </p:txEl>
+                                          </p:spTgt>
+                                        </p:tgtEl>
+                                        <p:attrNameLst>
+                                          <p:attrName>style.visibility</p:attrName>
+                                        </p:attrNameLst>
+                                      </p:cBhvr>
+                                      <p:to>
+                                        <p:strVal val="visible"/>
+                                      </p:to>
+                                    </p:set>
+                                  </p:childTnLst>
+                                </p:cTn>
+                              </p:par>
+                            </p:childTnLst>
+                          </p:cTn>
+                        </p:par>
+                      </p:childTnLst>
+                    </p:cTn>
+                  </p:par>
+                  <p:par>
+                    <p:cTn id="15" fill="hold">
+                      <p:stCondLst>
+                        <p:cond delay="indefinite"/>
+                      </p:stCondLst>
+                      <p:childTnLst>
+                        <p:par>
+                          <p:cTn id="16" fill="hold">
+                            <p:stCondLst>
+                              <p:cond delay="0"/>
+                            </p:stCondLst>
+                            <p:childTnLst>
+                              <p:par>
+                                <p:cTn id="17" presetID="1" presetClass="entr" presetSubtype="0" fill="hold" grpId="0" nodeType="clickEffect">
+                                  <p:stCondLst>
+                                    <p:cond delay="0"/>
+                                  </p:stCondLst>
+                                  <p:childTnLst>
+                                    <p:set>
+                                      <p:cBhvr>
+                                        <p:cTn id="18" dur="1" fill="hold">
+                                          <p:stCondLst>
+                                            <p:cond delay="0"/>
+                                          </p:stCondLst>
+                                        </p:cTn>
+                                        <p:tgtEl>
+                                          <p:spTgt spid="21"/>
+                                        </p:tgtEl>
+                                        <p:attrNameLst>
+                                          <p:attrName>style.visibility</p:attrName>
+                                        </p:attrNameLst>
+                                      </p:cBhvr>
+                                      <p:to>
+                                        <p:strVal val="visible"/>
+                                      </p:to>
+                                    </p:set>
+                                  </p:childTnLst>
+                                </p:cTn>
+                              </p:par>
+                              <p:par>
+                                <p:cTn id="19" presetID="1" presetClass="entr" presetSubtype="0" fill="hold" nodeType="withEffect">
+                                  <p:stCondLst>
+                                    <p:cond delay="0"/>
+                                  </p:stCondLst>
+                                  <p:childTnLst>
+                                    <p:set>
+                                      <p:cBhvr>
+                                        <p:cTn id="20" dur="1" fill="hold">
+                                          <p:stCondLst>
+                                            <p:cond delay="0"/>
+                                          </p:stCondLst>
+                                        </p:cTn>
+                                        <p:tgtEl>
+                                          <p:spTgt spid="6"/>
+                                        </p:tgtEl>
+                                        <p:attrNameLst>
+                                          <p:attrName>style.visibility</p:attrName>
+                                        </p:attrNameLst>
+                                      </p:cBhvr>
+                                      <p:to>
+                                        <p:strVal val="visible"/>
+                                      </p:to>
+                                    </p:set>
+                                  </p:childTnLst>
+                                </p:cTn>
+                              </p:par>
+                            </p:childTnLst>
+                          </p:cTn>
+                        </p:par>
+                      </p:childTnLst>
+                    </p:cTn>
+                  </p:par>
+                  <p:par>
+                    <p:cTn id="21" fill="hold">
+                      <p:stCondLst>
+                        <p:cond delay="indefinite"/>
+                      </p:stCondLst>
+                      <p:childTnLst>
+                        <p:par>
+                          <p:cTn id="22" fill="hold">
+                            <p:stCondLst>
+                              <p:cond delay="0"/>
+                            </p:stCondLst>
+                            <p:childTnLst>
+                              <p:par>
+                                <p:cTn id="23" presetID="1" presetClass="entr" presetSubtype="0" fill="hold" nodeType="clickEffect">
+                                  <p:stCondLst>
+                                    <p:cond delay="0"/>
+                                  </p:stCondLst>
+                                  <p:childTnLst>
+                                    <p:set>
+                                      <p:cBhvr>
+                                        <p:cTn id="24" dur="1" fill="hold">
+                                          <p:stCondLst>
+                                            <p:cond delay="0"/>
+                                          </p:stCondLst>
+                                        </p:cTn>
+                                        <p:tgtEl>
+                                          <p:spTgt spid="7">
+                                            <p:txEl>
                                               <p:pRg st="2" end="2"/>
                                             </p:txEl>
                                           </p:spTgt>
@@ -17762,21 +17803,39 @@
                                   </p:childTnLst>
                                 </p:cTn>
                               </p:par>
+                            </p:childTnLst>
+                          </p:cTn>
+                        </p:par>
+                      </p:childTnLst>
+                    </p:cTn>
+                  </p:par>
+                  <p:par>
+                    <p:cTn id="25" fill="hold">
+                      <p:stCondLst>
+                        <p:cond delay="indefinite"/>
+                      </p:stCondLst>
+                      <p:childTnLst>
+                        <p:par>
+                          <p:cTn id="26" fill="hold">
+                            <p:stCondLst>
+                              <p:cond delay="0"/>
+                            </p:stCondLst>
+                            <p:childTnLst>
                               <p:par>
-                                <p:cTn id="15" presetID="1" presetClass="entr" presetSubtype="0" fill="hold" nodeType="withEffect">
+                                <p:cTn id="27" presetID="1" presetClass="entr" presetSubtype="0" fill="hold" grpId="0" nodeType="clickEffect">
                                   <p:stCondLst>
                                     <p:cond delay="0"/>
                                   </p:stCondLst>
                                   <p:childTnLst>
                                     <p:set>
                                       <p:cBhvr>
-                                        <p:cTn id="16" dur="1" fill="hold">
+                                        <p:cTn id="28" dur="1" fill="hold">
                                           <p:stCondLst>
                                             <p:cond delay="0"/>
                                           </p:stCondLst>
                                         </p:cTn>
                                         <p:tgtEl>
-                                          <p:spTgt spid="16"/>
+                                          <p:spTgt spid="12"/>
                                         </p:tgtEl>
                                         <p:attrNameLst>
                                           <p:attrName>style.visibility</p:attrName>
@@ -17790,20 +17849,20 @@
                                 </p:cTn>
                               </p:par>
                               <p:par>
-                                <p:cTn id="17" presetID="1" presetClass="entr" presetSubtype="0" fill="hold" grpId="0" nodeType="withEffect">
+                                <p:cTn id="29" presetID="1" presetClass="entr" presetSubtype="0" fill="hold" nodeType="withEffect">
                                   <p:stCondLst>
                                     <p:cond delay="0"/>
                                   </p:stCondLst>
                                   <p:childTnLst>
                                     <p:set>
                                       <p:cBhvr>
-                                        <p:cTn id="18" dur="1" fill="hold">
+                                        <p:cTn id="30" dur="1" fill="hold">
                                           <p:stCondLst>
                                             <p:cond delay="0"/>
                                           </p:stCondLst>
                                         </p:cTn>
                                         <p:tgtEl>
-                                          <p:spTgt spid="12"/>
+                                          <p:spTgt spid="16"/>
                                         </p:tgtEl>
                                         <p:attrNameLst>
                                           <p:attrName>style.visibility</p:attrName>
@@ -17844,6 +17903,7 @@
       </p:par>
     </p:tnLst>
     <p:bldLst>
+      <p:bldP spid="9" grpId="0" animBg="1"/>
       <p:bldP spid="12" grpId="0" animBg="1"/>
       <p:bldP spid="21" grpId="0" animBg="1"/>
     </p:bldLst>
@@ -23068,7 +23128,12 @@
             <p:ph type="body" sz="quarter" idx="10"/>
           </p:nvPr>
         </p:nvSpPr>
-        <p:spPr/>
+        <p:spPr>
+          <a:xfrm>
+            <a:off x="190406" y="664617"/>
+            <a:ext cx="11818096" cy="5528766"/>
+          </a:xfrm>
+        </p:spPr>
         <p:txBody>
           <a:bodyPr>
             <a:normAutofit/>
@@ -25928,7 +25993,25 @@
                   </a:outerShdw>
                 </a:effectLst>
               </a:rPr>
-              <a:t>Член на инстанцията</a:t>
+              <a:t>Член на </a:t>
+            </a:r>
+            <a:r>
+              <a:rPr lang="bg-BG" sz="2600" b="1" dirty="0">
+                <a:solidFill>
+                  <a:schemeClr val="bg1">
+                    <a:lumMod val="60000"/>
+                    <a:lumOff val="40000"/>
+                  </a:schemeClr>
+                </a:solidFill>
+                <a:effectLst>
+                  <a:outerShdw blurRad="38100" dist="38100" dir="2700000" algn="tl">
+                    <a:srgbClr val="000000">
+                      <a:alpha val="43137"/>
+                    </a:srgbClr>
+                  </a:outerShdw>
+                </a:effectLst>
+              </a:rPr>
+              <a:t>инстанцията</a:t>
             </a:r>
           </a:p>
         </p:txBody>
@@ -26007,7 +26090,28 @@
                   </a:outerShdw>
                 </a:effectLst>
               </a:rPr>
-              <a:t>Член на базовия клас</a:t>
+              <a:t>Член на </a:t>
+            </a:r>
+          </a:p>
+          <a:p>
+            <a:pPr algn="ctr" eaLnBrk="0" hangingPunct="0"/>
+            <a:r>
+              <a:rPr lang="bg-BG" sz="2600" b="1" dirty="0">
+                <a:solidFill>
+                  <a:schemeClr val="bg1">
+                    <a:lumMod val="60000"/>
+                    <a:lumOff val="40000"/>
+                  </a:schemeClr>
+                </a:solidFill>
+                <a:effectLst>
+                  <a:outerShdw blurRad="38100" dist="38100" dir="2700000" algn="tl">
+                    <a:srgbClr val="000000">
+                      <a:alpha val="43137"/>
+                    </a:srgbClr>
+                  </a:outerShdw>
+                </a:effectLst>
+              </a:rPr>
+              <a:t>базовия клас</a:t>
             </a:r>
           </a:p>
         </p:txBody>
@@ -26076,6 +26180,24 @@
             <a:r>
               <a:rPr lang="bg-BG" sz="2600" b="1" dirty="0">
                 <a:solidFill>
+                  <a:schemeClr val="bg1">
+                    <a:lumMod val="60000"/>
+                    <a:lumOff val="40000"/>
+                  </a:schemeClr>
+                </a:solidFill>
+                <a:effectLst>
+                  <a:outerShdw blurRad="38100" dist="38100" dir="2700000" algn="tl">
+                    <a:srgbClr val="000000">
+                      <a:alpha val="43137"/>
+                    </a:srgbClr>
+                  </a:outerShdw>
+                </a:effectLst>
+              </a:rPr>
+              <a:t>Локална</a:t>
+            </a:r>
+            <a:r>
+              <a:rPr lang="bg-BG" sz="2600" b="1" dirty="0">
+                <a:solidFill>
                   <a:schemeClr val="bg2"/>
                 </a:solidFill>
                 <a:effectLst>
@@ -26086,7 +26208,7 @@
                   </a:outerShdw>
                 </a:effectLst>
               </a:rPr>
-              <a:t>Локална променлива</a:t>
+              <a:t> променлива</a:t>
             </a:r>
           </a:p>
         </p:txBody>
@@ -29393,8 +29515,8 @@
         </p:nvSpPr>
         <p:spPr bwMode="auto">
           <a:xfrm>
-            <a:off x="4295948" y="4847937"/>
-            <a:ext cx="1412102" cy="527804"/>
+            <a:off x="3740956" y="4847937"/>
+            <a:ext cx="1967094" cy="527804"/>
           </a:xfrm>
           <a:prstGeom prst="wedgeRoundRectCallout">
             <a:avLst>
@@ -29445,7 +29567,7 @@
           <a:p>
             <a:pPr algn="ctr" eaLnBrk="0" hangingPunct="0"/>
             <a:r>
-              <a:rPr lang="en-US" sz="2500" b="1" dirty="0">
+              <a:rPr lang="bg-BG" sz="2500" b="1" dirty="0">
                 <a:solidFill>
                   <a:schemeClr val="bg2"/>
                 </a:solidFill>
@@ -29457,20 +29579,8 @@
                   </a:outerShdw>
                 </a:effectLst>
               </a:rPr>
-              <a:t>Extends</a:t>
-            </a:r>
-            <a:endParaRPr lang="bg-BG" sz="2500" b="1" dirty="0">
-              <a:solidFill>
-                <a:schemeClr val="bg2"/>
-              </a:solidFill>
-              <a:effectLst>
-                <a:outerShdw blurRad="38100" dist="38100" dir="2700000" algn="tl">
-                  <a:srgbClr val="000000">
-                    <a:alpha val="43137"/>
-                  </a:srgbClr>
-                </a:outerShdw>
-              </a:effectLst>
-            </a:endParaRPr>
+              <a:t>Разширява</a:t>
+            </a:r>
           </a:p>
         </p:txBody>
       </p:sp>
@@ -42023,6 +42133,13 @@
               </a:rPr>
               <a:t>Наследяването ни позволява да </a:t>
             </a:r>
+            <a:br>
+              <a:rPr lang="bg-BG" sz="3600" dirty="0">
+                <a:solidFill>
+                  <a:schemeClr val="bg2"/>
+                </a:solidFill>
+              </a:rPr>
+            </a:br>
             <a:r>
               <a:rPr lang="bg-BG" sz="3600" b="1" dirty="0" err="1">
                 <a:solidFill>
@@ -42191,6 +42308,13 @@
               </a:rPr>
               <a:t> </a:t>
             </a:r>
+            <a:br>
+              <a:rPr lang="bg-BG" sz="3600" dirty="0">
+                <a:solidFill>
+                  <a:schemeClr val="bg2"/>
+                </a:solidFill>
+              </a:rPr>
+            </a:br>
             <a:r>
               <a:rPr lang="bg-BG" sz="3600" dirty="0">
                 <a:solidFill>
@@ -47420,7 +47544,7 @@
                                           </p:stCondLst>
                                         </p:cTn>
                                         <p:tgtEl>
-                                          <p:spTgt spid="21"/>
+                                          <p:spTgt spid="14"/>
                                         </p:tgtEl>
                                         <p:attrNameLst>
                                           <p:attrName>style.visibility</p:attrName>
@@ -47447,6 +47571,60 @@
                                           </p:stCondLst>
                                         </p:cTn>
                                         <p:tgtEl>
+                                          <p:spTgt spid="16"/>
+                                        </p:tgtEl>
+                                        <p:attrNameLst>
+                                          <p:attrName>style.visibility</p:attrName>
+                                        </p:attrNameLst>
+                                      </p:cBhvr>
+                                      <p:to>
+                                        <p:strVal val="visible"/>
+                                      </p:to>
+                                    </p:set>
+                                  </p:childTnLst>
+                                </p:cTn>
+                              </p:par>
+                              <p:par>
+                                <p:cTn id="23" presetID="1" presetClass="entr" presetSubtype="0" fill="hold" grpId="0" nodeType="withEffect">
+                                  <p:stCondLst>
+                                    <p:cond delay="0"/>
+                                  </p:stCondLst>
+                                  <p:childTnLst>
+                                    <p:set>
+                                      <p:cBhvr>
+                                        <p:cTn id="24" dur="1" fill="hold">
+                                          <p:stCondLst>
+                                            <p:cond delay="0"/>
+                                          </p:stCondLst>
+                                        </p:cTn>
+                                        <p:tgtEl>
+                                          <p:spTgt spid="21"/>
+                                        </p:tgtEl>
+                                        <p:attrNameLst>
+                                          <p:attrName>style.visibility</p:attrName>
+                                        </p:attrNameLst>
+                                      </p:cBhvr>
+                                      <p:to>
+                                        <p:strVal val="visible"/>
+                                      </p:to>
+                                    </p:set>
+                                  </p:childTnLst>
+                                </p:cTn>
+                              </p:par>
+                              <p:par>
+                                <p:cTn id="25" presetID="1" presetClass="entr" presetSubtype="0" fill="hold" grpId="0" nodeType="withEffect">
+                                  <p:stCondLst>
+                                    <p:cond delay="0"/>
+                                  </p:stCondLst>
+                                  <p:childTnLst>
+                                    <p:set>
+                                      <p:cBhvr>
+                                        <p:cTn id="26" dur="1" fill="hold">
+                                          <p:stCondLst>
+                                            <p:cond delay="0"/>
+                                          </p:stCondLst>
+                                        </p:cTn>
+                                        <p:tgtEl>
                                           <p:spTgt spid="12"/>
                                         </p:tgtEl>
                                         <p:attrNameLst>
@@ -47467,73 +47645,19 @@
                     </p:cTn>
                   </p:par>
                   <p:par>
-                    <p:cTn id="23" fill="hold">
+                    <p:cTn id="27" fill="hold">
                       <p:stCondLst>
                         <p:cond delay="indefinite"/>
                       </p:stCondLst>
                       <p:childTnLst>
                         <p:par>
-                          <p:cTn id="24" fill="hold">
+                          <p:cTn id="28" fill="hold">
                             <p:stCondLst>
                               <p:cond delay="0"/>
                             </p:stCondLst>
                             <p:childTnLst>
                               <p:par>
-                                <p:cTn id="25" presetID="1" presetClass="entr" presetSubtype="0" fill="hold" grpId="0" nodeType="clickEffect">
-                                  <p:stCondLst>
-                                    <p:cond delay="0"/>
-                                  </p:stCondLst>
-                                  <p:childTnLst>
-                                    <p:set>
-                                      <p:cBhvr>
-                                        <p:cTn id="26" dur="1" fill="hold">
-                                          <p:stCondLst>
-                                            <p:cond delay="0"/>
-                                          </p:stCondLst>
-                                        </p:cTn>
-                                        <p:tgtEl>
-                                          <p:spTgt spid="17"/>
-                                        </p:tgtEl>
-                                        <p:attrNameLst>
-                                          <p:attrName>style.visibility</p:attrName>
-                                        </p:attrNameLst>
-                                      </p:cBhvr>
-                                      <p:to>
-                                        <p:strVal val="visible"/>
-                                      </p:to>
-                                    </p:set>
-                                  </p:childTnLst>
-                                </p:cTn>
-                              </p:par>
-                              <p:par>
-                                <p:cTn id="27" presetID="1" presetClass="entr" presetSubtype="0" fill="hold" grpId="0" nodeType="withEffect">
-                                  <p:stCondLst>
-                                    <p:cond delay="0"/>
-                                  </p:stCondLst>
-                                  <p:childTnLst>
-                                    <p:set>
-                                      <p:cBhvr>
-                                        <p:cTn id="28" dur="1" fill="hold">
-                                          <p:stCondLst>
-                                            <p:cond delay="0"/>
-                                          </p:stCondLst>
-                                        </p:cTn>
-                                        <p:tgtEl>
-                                          <p:spTgt spid="14"/>
-                                        </p:tgtEl>
-                                        <p:attrNameLst>
-                                          <p:attrName>style.visibility</p:attrName>
-                                        </p:attrNameLst>
-                                      </p:cBhvr>
-                                      <p:to>
-                                        <p:strVal val="visible"/>
-                                      </p:to>
-                                    </p:set>
-                                  </p:childTnLst>
-                                </p:cTn>
-                              </p:par>
-                              <p:par>
-                                <p:cTn id="29" presetID="1" presetClass="entr" presetSubtype="0" fill="hold" grpId="0" nodeType="withEffect">
+                                <p:cTn id="29" presetID="1" presetClass="entr" presetSubtype="0" fill="hold" grpId="0" nodeType="clickEffect">
                                   <p:stCondLst>
                                     <p:cond delay="0"/>
                                   </p:stCondLst>
@@ -47546,7 +47670,7 @@
                                           </p:stCondLst>
                                         </p:cTn>
                                         <p:tgtEl>
-                                          <p:spTgt spid="16"/>
+                                          <p:spTgt spid="17"/>
                                         </p:tgtEl>
                                         <p:attrNameLst>
                                           <p:attrName>style.visibility</p:attrName>
@@ -47804,8 +47928,8 @@
         </p:nvSpPr>
         <p:spPr>
           <a:xfrm>
-            <a:off x="2133600" y="4990818"/>
-            <a:ext cx="3600000" cy="1486183"/>
+            <a:off x="2414544" y="5175114"/>
+            <a:ext cx="3457604" cy="1301887"/>
           </a:xfrm>
           <a:prstGeom prst="roundRect">
             <a:avLst>
@@ -47893,8 +48017,8 @@
         </p:nvSpPr>
         <p:spPr>
           <a:xfrm>
-            <a:off x="6103799" y="4990818"/>
-            <a:ext cx="3954601" cy="1486183"/>
+            <a:off x="6056099" y="5175114"/>
+            <a:ext cx="3782400" cy="1301887"/>
           </a:xfrm>
           <a:prstGeom prst="roundRect">
             <a:avLst>
@@ -48160,8 +48284,8 @@
         </p:nvSpPr>
         <p:spPr>
           <a:xfrm>
-            <a:off x="2285539" y="5722355"/>
-            <a:ext cx="1606499" cy="557218"/>
+            <a:off x="2522573" y="5799359"/>
+            <a:ext cx="1542955" cy="488119"/>
           </a:xfrm>
           <a:prstGeom prst="roundRect">
             <a:avLst>
@@ -48226,8 +48350,8 @@
         </p:nvSpPr>
         <p:spPr>
           <a:xfrm>
-            <a:off x="6286050" y="5683335"/>
-            <a:ext cx="1654194" cy="557218"/>
+            <a:off x="6254856" y="5777350"/>
+            <a:ext cx="1582163" cy="488119"/>
           </a:xfrm>
           <a:prstGeom prst="roundRect">
             <a:avLst>
@@ -48419,8 +48543,8 @@
         </p:nvSpPr>
         <p:spPr>
           <a:xfrm>
-            <a:off x="4003543" y="5722355"/>
-            <a:ext cx="1606499" cy="557218"/>
+            <a:off x="4240577" y="5799359"/>
+            <a:ext cx="1542955" cy="488119"/>
           </a:xfrm>
           <a:prstGeom prst="roundRect">
             <a:avLst>
@@ -48491,8 +48615,8 @@
         </p:nvSpPr>
         <p:spPr>
           <a:xfrm>
-            <a:off x="8153400" y="5683335"/>
-            <a:ext cx="1654194" cy="557218"/>
+            <a:off x="8122206" y="5777350"/>
+            <a:ext cx="1582163" cy="488119"/>
           </a:xfrm>
           <a:prstGeom prst="roundRect">
             <a:avLst>
@@ -48565,8 +48689,8 @@
         </p:nvSpPr>
         <p:spPr bwMode="auto">
           <a:xfrm>
-            <a:off x="10020750" y="5463127"/>
-            <a:ext cx="2169999" cy="919401"/>
+            <a:off x="9756609" y="5481238"/>
+            <a:ext cx="2333969" cy="919401"/>
           </a:xfrm>
           <a:prstGeom prst="wedgeRoundRectCallout">
             <a:avLst>
@@ -48692,13 +48816,13 @@
         </p:nvSpPr>
         <p:spPr bwMode="auto">
           <a:xfrm>
-            <a:off x="0" y="5513695"/>
-            <a:ext cx="2107079" cy="919401"/>
+            <a:off x="1" y="5539406"/>
+            <a:ext cx="2353500" cy="919401"/>
           </a:xfrm>
           <a:prstGeom prst="wedgeRoundRectCallout">
             <a:avLst>
-              <a:gd name="adj1" fmla="val 71736"/>
-              <a:gd name="adj2" fmla="val 17899"/>
+              <a:gd name="adj1" fmla="val 71279"/>
+              <a:gd name="adj2" fmla="val 26089"/>
               <a:gd name="adj3" fmla="val 16667"/>
             </a:avLst>
           </a:prstGeom>

</xml_diff>

<commit_message>
Updated metadata for "10. Inheritance"
</commit_message>
<xml_diff>
--- a/Courses/Software-Sciences/Module-1-OOP-New/10-Inheritance/10-Inheritance.pptx
+++ b/Courses/Software-Sciences/Module-1-OOP-New/10-Inheritance/10-Inheritance.pptx
@@ -333,7 +333,7 @@
           <a:p>
             <a:fld id="{4E087215-0C8F-4762-A664-737A353EC9A4}" type="datetimeFigureOut">
               <a:rPr lang="bg-BG" smtClean="0"/>
-              <a:t>16.01.23 г.</a:t>
+              <a:t>18.01.23 г.</a:t>
             </a:fld>
             <a:endParaRPr lang="bg-BG"/>
           </a:p>
@@ -524,7 +524,7 @@
           <a:p>
             <a:fld id="{72D84649-876A-46C9-8472-14CB09C070D8}" type="datetimeFigureOut">
               <a:rPr lang="en-US" smtClean="0"/>
-              <a:t>1/16/23</a:t>
+              <a:t>1/18/23</a:t>
             </a:fld>
             <a:endParaRPr lang="en-US"/>
           </a:p>

</xml_diff>